<commit_message>
@strever update model note
</commit_message>
<xml_diff>
--- a/assets/misc/flutter.pptx
+++ b/assets/misc/flutter.pptx
@@ -3378,6 +3378,31 @@
         <p:txBody>
           <a:bodyPr/>
           <a:p>
+            <a:r>
+              <a:rPr lang="zh-CN" altLang="en-US"/>
+              <a:t>多加点媒体</a:t>
+            </a:r>
+            <a:r>
+              <a:rPr lang="zh-CN" altLang="en-US"/>
+              <a:t>素材</a:t>
+            </a:r>
+            <a:endParaRPr lang="zh-CN" altLang="en-US"/>
+          </a:p>
+          <a:p>
+            <a:r>
+              <a:rPr lang="zh-CN" altLang="en-US"/>
+              <a:t>偷点闲鱼技术</a:t>
+            </a:r>
+            <a:r>
+              <a:rPr lang="zh-CN" altLang="en-US"/>
+              <a:t>分享的图</a:t>
+            </a:r>
+            <a:endParaRPr lang="zh-CN" altLang="en-US"/>
+          </a:p>
+          <a:p>
+            <a:endParaRPr lang="zh-CN" altLang="en-US"/>
+          </a:p>
+          <a:p>
             <a:endParaRPr lang="zh-CN" altLang="en-US"/>
           </a:p>
         </p:txBody>
@@ -3443,7 +3468,11 @@
             <a:endParaRPr lang="zh-CN" altLang="en-US"/>
           </a:p>
           <a:p>
-            <a:endParaRPr lang="zh-CN" altLang="en-US"/>
+            <a:r>
+              <a:rPr lang="en-US" altLang="zh-CN"/>
+              <a:t>dart.dev</a:t>
+            </a:r>
+            <a:endParaRPr lang="en-US" altLang="zh-CN"/>
           </a:p>
         </p:txBody>
       </p:sp>
@@ -4491,7 +4520,11 @@
         <p:txBody>
           <a:bodyPr/>
           <a:p>
-            <a:endParaRPr lang="zh-CN" altLang="en-US"/>
+            <a:r>
+              <a:rPr lang="en-US" altLang="zh-CN"/>
+              <a:t>Skia</a:t>
+            </a:r>
+            <a:endParaRPr lang="en-US" altLang="zh-CN"/>
           </a:p>
         </p:txBody>
       </p:sp>

</xml_diff>